<commit_message>
leap motion project moved to session7
</commit_message>
<xml_diff>
--- a/session6/presentation/Regular_Expressions.pptx
+++ b/session6/presentation/Regular_Expressions.pptx
@@ -299,7 +299,7 @@
           <a:p>
             <a:fld id="{1139FA4A-C808-4981-8BA9-64217A6CCEA7}" type="datetimeFigureOut">
               <a:rPr lang="en-US" smtClean="0"/>
-              <a:t>3/6/2018</a:t>
+              <a:t>3/7/2018</a:t>
             </a:fld>
             <a:endParaRPr lang="en-US"/>
           </a:p>
@@ -467,7 +467,7 @@
           <a:p>
             <a:fld id="{1139FA4A-C808-4981-8BA9-64217A6CCEA7}" type="datetimeFigureOut">
               <a:rPr lang="en-US" smtClean="0"/>
-              <a:t>3/6/2018</a:t>
+              <a:t>3/7/2018</a:t>
             </a:fld>
             <a:endParaRPr lang="en-US"/>
           </a:p>
@@ -645,7 +645,7 @@
           <a:p>
             <a:fld id="{1139FA4A-C808-4981-8BA9-64217A6CCEA7}" type="datetimeFigureOut">
               <a:rPr lang="en-US" smtClean="0"/>
-              <a:t>3/6/2018</a:t>
+              <a:t>3/7/2018</a:t>
             </a:fld>
             <a:endParaRPr lang="en-US"/>
           </a:p>
@@ -813,7 +813,7 @@
           <a:p>
             <a:fld id="{1139FA4A-C808-4981-8BA9-64217A6CCEA7}" type="datetimeFigureOut">
               <a:rPr lang="en-US" smtClean="0"/>
-              <a:t>3/6/2018</a:t>
+              <a:t>3/7/2018</a:t>
             </a:fld>
             <a:endParaRPr lang="en-US"/>
           </a:p>
@@ -1058,7 +1058,7 @@
           <a:p>
             <a:fld id="{1139FA4A-C808-4981-8BA9-64217A6CCEA7}" type="datetimeFigureOut">
               <a:rPr lang="en-US" smtClean="0"/>
-              <a:t>3/6/2018</a:t>
+              <a:t>3/7/2018</a:t>
             </a:fld>
             <a:endParaRPr lang="en-US"/>
           </a:p>
@@ -1287,7 +1287,7 @@
           <a:p>
             <a:fld id="{1139FA4A-C808-4981-8BA9-64217A6CCEA7}" type="datetimeFigureOut">
               <a:rPr lang="en-US" smtClean="0"/>
-              <a:t>3/6/2018</a:t>
+              <a:t>3/7/2018</a:t>
             </a:fld>
             <a:endParaRPr lang="en-US"/>
           </a:p>
@@ -1651,7 +1651,7 @@
           <a:p>
             <a:fld id="{1139FA4A-C808-4981-8BA9-64217A6CCEA7}" type="datetimeFigureOut">
               <a:rPr lang="en-US" smtClean="0"/>
-              <a:t>3/6/2018</a:t>
+              <a:t>3/7/2018</a:t>
             </a:fld>
             <a:endParaRPr lang="en-US"/>
           </a:p>
@@ -1768,7 +1768,7 @@
           <a:p>
             <a:fld id="{1139FA4A-C808-4981-8BA9-64217A6CCEA7}" type="datetimeFigureOut">
               <a:rPr lang="en-US" smtClean="0"/>
-              <a:t>3/6/2018</a:t>
+              <a:t>3/7/2018</a:t>
             </a:fld>
             <a:endParaRPr lang="en-US"/>
           </a:p>
@@ -1863,7 +1863,7 @@
           <a:p>
             <a:fld id="{1139FA4A-C808-4981-8BA9-64217A6CCEA7}" type="datetimeFigureOut">
               <a:rPr lang="en-US" smtClean="0"/>
-              <a:t>3/6/2018</a:t>
+              <a:t>3/7/2018</a:t>
             </a:fld>
             <a:endParaRPr lang="en-US"/>
           </a:p>
@@ -2138,7 +2138,7 @@
           <a:p>
             <a:fld id="{1139FA4A-C808-4981-8BA9-64217A6CCEA7}" type="datetimeFigureOut">
               <a:rPr lang="en-US" smtClean="0"/>
-              <a:t>3/6/2018</a:t>
+              <a:t>3/7/2018</a:t>
             </a:fld>
             <a:endParaRPr lang="en-US"/>
           </a:p>
@@ -2390,7 +2390,7 @@
           <a:p>
             <a:fld id="{1139FA4A-C808-4981-8BA9-64217A6CCEA7}" type="datetimeFigureOut">
               <a:rPr lang="en-US" smtClean="0"/>
-              <a:t>3/6/2018</a:t>
+              <a:t>3/7/2018</a:t>
             </a:fld>
             <a:endParaRPr lang="en-US"/>
           </a:p>
@@ -2601,7 +2601,7 @@
           <a:p>
             <a:fld id="{1139FA4A-C808-4981-8BA9-64217A6CCEA7}" type="datetimeFigureOut">
               <a:rPr lang="en-US" smtClean="0"/>
-              <a:t>3/6/2018</a:t>
+              <a:t>3/7/2018</a:t>
             </a:fld>
             <a:endParaRPr lang="en-US"/>
           </a:p>
@@ -3187,15 +3187,7 @@
             </a:r>
             <a:r>
               <a:rPr lang="en-US" dirty="0" smtClean="0"/>
-              <a:t>you‘re going to learn about </a:t>
-            </a:r>
-            <a:r>
-              <a:rPr lang="en-US" dirty="0" smtClean="0"/>
-              <a:t>Regular Expressions</a:t>
-            </a:r>
-            <a:r>
-              <a:rPr lang="en-US" dirty="0" smtClean="0"/>
-              <a:t>, </a:t>
+              <a:t>you‘re going to learn about Regular Expressions, </a:t>
             </a:r>
             <a:r>
               <a:rPr lang="en-US" dirty="0"/>
@@ -16639,13 +16631,6 @@
               </a:rPr>
               <a:t>    work 1-(800) 555.1212 #1234 </a:t>
             </a:r>
-            <a:endParaRPr lang="en-US" sz="2000" b="1" i="1" dirty="0">
-              <a:solidFill>
-                <a:srgbClr val="0070C0"/>
-              </a:solidFill>
-              <a:latin typeface="Consolas" panose="020B0609020204030204" pitchFamily="49" charset="0"/>
-              <a:cs typeface="Consolas" panose="020B0609020204030204" pitchFamily="49" charset="0"/>
-            </a:endParaRPr>
           </a:p>
           <a:p>
             <a:pPr marL="342900" indent="-342900">
@@ -18649,7 +18634,6 @@
               <a:rPr lang="en-US" sz="2000" dirty="0"/>
               <a:t>The next example shows the regular expression to handle separators between the different parts of the phone number. </a:t>
             </a:r>
-            <a:endParaRPr lang="en-US" sz="2000" dirty="0"/>
           </a:p>
         </p:txBody>
       </p:sp>
@@ -19402,7 +19386,6 @@
               <a:rPr lang="en-US" sz="2000" dirty="0"/>
               <a:t>The next example shows the regular expression for handling phone numbers without separators. </a:t>
             </a:r>
-            <a:endParaRPr lang="en-US" sz="2000" dirty="0"/>
           </a:p>
         </p:txBody>
       </p:sp>
@@ -20502,7 +20485,6 @@
               <a:rPr lang="en-US" sz="2000" dirty="0"/>
               <a:t>The next example shows how to handle leading characters in phone numbers. </a:t>
             </a:r>
-            <a:endParaRPr lang="en-US" sz="2000" dirty="0"/>
           </a:p>
         </p:txBody>
       </p:sp>
@@ -21192,7 +21174,6 @@
               <a:rPr lang="en-US" sz="2000" dirty="0"/>
               <a:t>Let’s back up for a second. So far the regular expressions have all matched from the beginning of the string. But now you see that there may be an indeterminate amount of stuff at the beginning of the string that you want to ignore. Rather than trying to match it all just so you can skip over it, let’s take a different approach: don’t explicitly match the beginning of the string at all. This approach is shown in the next example. </a:t>
             </a:r>
-            <a:endParaRPr lang="en-US" sz="2000" dirty="0"/>
           </a:p>
         </p:txBody>
       </p:sp>
@@ -21798,7 +21779,6 @@
               <a:rPr lang="en-US" sz="2000" dirty="0"/>
               <a:t>Let’s back up for a second. So far the regular expressions have all matched from the beginning of the string. But now you see that there may be an indeterminate amount of stuff at the beginning of the string that you want to ignore. Rather than trying to match it all just so you can skip over it, let’s take a different approach: don’t explicitly match the beginning of the string at all. This approach is shown in the next example. </a:t>
             </a:r>
-            <a:endParaRPr lang="en-US" sz="2000" dirty="0"/>
           </a:p>
         </p:txBody>
       </p:sp>
@@ -22631,7 +22611,6 @@
               <a:rPr lang="en-US" sz="2000" dirty="0"/>
               <a:t>While you still understand the final answer (and it is the final answer; if you’ve discovered a case it doesn’t handle, I don’t want to know about it), let’s write it out as a verbose regular expression, before you forget why you made the choices you made. </a:t>
             </a:r>
-            <a:endParaRPr lang="en-US" sz="2000" dirty="0"/>
           </a:p>
         </p:txBody>
       </p:sp>
@@ -23148,7 +23127,6 @@
               <a:rPr lang="en-US" sz="2000" dirty="0"/>
               <a:t>	Final sanity check. Yes, this still works. You’re done. </a:t>
             </a:r>
-            <a:endParaRPr lang="en-US" sz="2000" dirty="0"/>
           </a:p>
         </p:txBody>
       </p:sp>
@@ -23871,7 +23849,6 @@
               <a:rPr lang="en-US" sz="2000" b="1" dirty="0"/>
               <a:t>method of the object returned by re.search. </a:t>
             </a:r>
-            <a:endParaRPr lang="en-US" sz="2000" b="1" dirty="0"/>
           </a:p>
         </p:txBody>
       </p:sp>
@@ -24172,7 +24149,6 @@
               <a:rPr lang="en-US" sz="2000" b="1" dirty="0"/>
               <a:t>should learn enough about them to know when they are appropriate, when they will solve your problems, and when they will cause more problems than they solve. </a:t>
             </a:r>
-            <a:endParaRPr lang="en-US" sz="2000" b="1" dirty="0"/>
           </a:p>
         </p:txBody>
       </p:sp>

</xml_diff>